<commit_message>
Updates to figures, etc
</commit_message>
<xml_diff>
--- a/Figures and Paper/SAMUS Figure.pptx
+++ b/Figures and Paper/SAMUS Figure.pptx
@@ -243,7 +243,7 @@
           <a:p>
             <a:fld id="{3B9C3AD5-EB72-4EC3-A7DF-443CA5C7FD88}" type="datetimeFigureOut">
               <a:rPr lang="en-US" smtClean="0"/>
-              <a:t>7/29/2022</a:t>
+              <a:t>8/4/2022</a:t>
             </a:fld>
             <a:endParaRPr lang="en-US"/>
           </a:p>
@@ -413,7 +413,7 @@
           <a:p>
             <a:fld id="{3B9C3AD5-EB72-4EC3-A7DF-443CA5C7FD88}" type="datetimeFigureOut">
               <a:rPr lang="en-US" smtClean="0"/>
-              <a:t>7/29/2022</a:t>
+              <a:t>8/4/2022</a:t>
             </a:fld>
             <a:endParaRPr lang="en-US"/>
           </a:p>
@@ -593,7 +593,7 @@
           <a:p>
             <a:fld id="{3B9C3AD5-EB72-4EC3-A7DF-443CA5C7FD88}" type="datetimeFigureOut">
               <a:rPr lang="en-US" smtClean="0"/>
-              <a:t>7/29/2022</a:t>
+              <a:t>8/4/2022</a:t>
             </a:fld>
             <a:endParaRPr lang="en-US"/>
           </a:p>
@@ -763,7 +763,7 @@
           <a:p>
             <a:fld id="{3B9C3AD5-EB72-4EC3-A7DF-443CA5C7FD88}" type="datetimeFigureOut">
               <a:rPr lang="en-US" smtClean="0"/>
-              <a:t>7/29/2022</a:t>
+              <a:t>8/4/2022</a:t>
             </a:fld>
             <a:endParaRPr lang="en-US"/>
           </a:p>
@@ -1007,7 +1007,7 @@
           <a:p>
             <a:fld id="{3B9C3AD5-EB72-4EC3-A7DF-443CA5C7FD88}" type="datetimeFigureOut">
               <a:rPr lang="en-US" smtClean="0"/>
-              <a:t>7/29/2022</a:t>
+              <a:t>8/4/2022</a:t>
             </a:fld>
             <a:endParaRPr lang="en-US"/>
           </a:p>
@@ -1239,7 +1239,7 @@
           <a:p>
             <a:fld id="{3B9C3AD5-EB72-4EC3-A7DF-443CA5C7FD88}" type="datetimeFigureOut">
               <a:rPr lang="en-US" smtClean="0"/>
-              <a:t>7/29/2022</a:t>
+              <a:t>8/4/2022</a:t>
             </a:fld>
             <a:endParaRPr lang="en-US"/>
           </a:p>
@@ -1606,7 +1606,7 @@
           <a:p>
             <a:fld id="{3B9C3AD5-EB72-4EC3-A7DF-443CA5C7FD88}" type="datetimeFigureOut">
               <a:rPr lang="en-US" smtClean="0"/>
-              <a:t>7/29/2022</a:t>
+              <a:t>8/4/2022</a:t>
             </a:fld>
             <a:endParaRPr lang="en-US"/>
           </a:p>
@@ -1724,7 +1724,7 @@
           <a:p>
             <a:fld id="{3B9C3AD5-EB72-4EC3-A7DF-443CA5C7FD88}" type="datetimeFigureOut">
               <a:rPr lang="en-US" smtClean="0"/>
-              <a:t>7/29/2022</a:t>
+              <a:t>8/4/2022</a:t>
             </a:fld>
             <a:endParaRPr lang="en-US"/>
           </a:p>
@@ -1819,7 +1819,7 @@
           <a:p>
             <a:fld id="{3B9C3AD5-EB72-4EC3-A7DF-443CA5C7FD88}" type="datetimeFigureOut">
               <a:rPr lang="en-US" smtClean="0"/>
-              <a:t>7/29/2022</a:t>
+              <a:t>8/4/2022</a:t>
             </a:fld>
             <a:endParaRPr lang="en-US"/>
           </a:p>
@@ -2096,7 +2096,7 @@
           <a:p>
             <a:fld id="{3B9C3AD5-EB72-4EC3-A7DF-443CA5C7FD88}" type="datetimeFigureOut">
               <a:rPr lang="en-US" smtClean="0"/>
-              <a:t>7/29/2022</a:t>
+              <a:t>8/4/2022</a:t>
             </a:fld>
             <a:endParaRPr lang="en-US"/>
           </a:p>
@@ -2353,7 +2353,7 @@
           <a:p>
             <a:fld id="{3B9C3AD5-EB72-4EC3-A7DF-443CA5C7FD88}" type="datetimeFigureOut">
               <a:rPr lang="en-US" smtClean="0"/>
-              <a:t>7/29/2022</a:t>
+              <a:t>8/4/2022</a:t>
             </a:fld>
             <a:endParaRPr lang="en-US"/>
           </a:p>
@@ -2566,7 +2566,7 @@
           <a:p>
             <a:fld id="{3B9C3AD5-EB72-4EC3-A7DF-443CA5C7FD88}" type="datetimeFigureOut">
               <a:rPr lang="en-US" smtClean="0"/>
-              <a:t>7/29/2022</a:t>
+              <a:t>8/4/2022</a:t>
             </a:fld>
             <a:endParaRPr lang="en-US"/>
           </a:p>
@@ -2973,10 +2973,10 @@
       </p:grpSpPr>
       <p:grpSp>
         <p:nvGrpSpPr>
-          <p:cNvPr id="18" name="Group 17">
+          <p:cNvPr id="3" name="Group 2">
             <a:extLst>
               <a:ext uri="{FF2B5EF4-FFF2-40B4-BE49-F238E27FC236}">
-                <a16:creationId xmlns:a16="http://schemas.microsoft.com/office/drawing/2014/main" id="{B9470344-EE13-41A8-861F-01F8EE9DBF62}"/>
+                <a16:creationId xmlns:a16="http://schemas.microsoft.com/office/drawing/2014/main" id="{3BC4DA34-F5B7-4000-98BF-BE1A9E8411B5}"/>
               </a:ext>
             </a:extLst>
           </p:cNvPr>
@@ -2987,7 +2987,7 @@
           <a:xfrm>
             <a:off x="790325" y="156468"/>
             <a:ext cx="10710425" cy="15635166"/>
-            <a:chOff x="1638465" y="275739"/>
+            <a:chOff x="790325" y="156468"/>
             <a:chExt cx="10710425" cy="15635166"/>
           </a:xfrm>
         </p:grpSpPr>
@@ -3005,7 +3005,7 @@
           </p:nvSpPr>
           <p:spPr>
             <a:xfrm>
-              <a:off x="3801588" y="1056658"/>
+              <a:off x="2953448" y="937387"/>
               <a:ext cx="4804501" cy="4094326"/>
             </a:xfrm>
             <a:prstGeom prst="flowChartProcess">
@@ -3238,7 +3238,7 @@
           </p:nvSpPr>
           <p:spPr>
             <a:xfrm>
-              <a:off x="1813961" y="5921596"/>
+              <a:off x="965821" y="5802325"/>
               <a:ext cx="3785746" cy="2191916"/>
             </a:xfrm>
             <a:prstGeom prst="rect">
@@ -3387,7 +3387,7 @@
           </p:nvCxnSpPr>
           <p:spPr>
             <a:xfrm>
-              <a:off x="6203838" y="696611"/>
+              <a:off x="5355698" y="577340"/>
               <a:ext cx="1" cy="360047"/>
             </a:xfrm>
             <a:prstGeom prst="straightConnector1">
@@ -3429,7 +3429,7 @@
           </p:nvSpPr>
           <p:spPr>
             <a:xfrm>
-              <a:off x="2009686" y="9862162"/>
+              <a:off x="1161546" y="9863157"/>
               <a:ext cx="3412665" cy="1058579"/>
             </a:xfrm>
             <a:prstGeom prst="rect">
@@ -3529,8 +3529,8 @@
           </p:nvSpPr>
           <p:spPr>
             <a:xfrm>
-              <a:off x="2354869" y="8391236"/>
-              <a:ext cx="2722300" cy="1017681"/>
+              <a:off x="1506729" y="8271965"/>
+              <a:ext cx="2722300" cy="1127074"/>
             </a:xfrm>
             <a:prstGeom prst="flowChartDecision">
               <a:avLst/>
@@ -3594,7 +3594,7 @@
           </p:nvSpPr>
           <p:spPr>
             <a:xfrm>
-              <a:off x="6920536" y="6635548"/>
+              <a:off x="6072396" y="6516277"/>
               <a:ext cx="4450008" cy="1069467"/>
             </a:xfrm>
             <a:prstGeom prst="rect">
@@ -3691,7 +3691,7 @@
           </p:nvSpPr>
           <p:spPr>
             <a:xfrm>
-              <a:off x="6920536" y="5921596"/>
+              <a:off x="6072396" y="5802325"/>
               <a:ext cx="4450011" cy="418064"/>
             </a:xfrm>
             <a:prstGeom prst="rect">
@@ -3742,8 +3742,8 @@
             </a:p>
           </p:txBody>
         </p:sp>
-        <mc:AlternateContent xmlns:mc="http://schemas.openxmlformats.org/markup-compatibility/2006" xmlns:a14="http://schemas.microsoft.com/office/drawing/2010/main">
-          <mc:Choice Requires="a14">
+        <mc:AlternateContent xmlns:mc="http://schemas.openxmlformats.org/markup-compatibility/2006">
+          <mc:Choice xmlns:a14="http://schemas.microsoft.com/office/drawing/2010/main" Requires="a14">
             <p:sp>
               <p:nvSpPr>
                 <p:cNvPr id="150" name="Rectangle 149">
@@ -3758,7 +3758,7 @@
               </p:nvSpPr>
               <p:spPr>
                 <a:xfrm>
-                  <a:off x="8180064" y="8000903"/>
+                  <a:off x="7331924" y="7881632"/>
                   <a:ext cx="1934867" cy="1036622"/>
                 </a:xfrm>
                 <a:prstGeom prst="flowChartDecision">
@@ -3860,7 +3860,7 @@
               </p:txBody>
             </p:sp>
           </mc:Choice>
-          <mc:Fallback xmlns="">
+          <mc:Fallback>
             <p:sp>
               <p:nvSpPr>
                 <p:cNvPr id="150" name="Rectangle 149">
@@ -3877,7 +3877,7 @@
               </p:nvSpPr>
               <p:spPr>
                 <a:xfrm>
-                  <a:off x="8180064" y="8000903"/>
+                  <a:off x="7331924" y="7881632"/>
                   <a:ext cx="1934867" cy="1036622"/>
                 </a:xfrm>
                 <a:prstGeom prst="flowChartDecision">
@@ -3924,7 +3924,7 @@
           </p:nvSpPr>
           <p:spPr>
             <a:xfrm>
-              <a:off x="7171939" y="9518310"/>
+              <a:off x="6323799" y="9399039"/>
               <a:ext cx="3951116" cy="1382933"/>
             </a:xfrm>
             <a:prstGeom prst="flowChartDecision">
@@ -3989,7 +3989,7 @@
           </p:nvSpPr>
           <p:spPr>
             <a:xfrm>
-              <a:off x="7044904" y="11468008"/>
+              <a:off x="6196764" y="11348737"/>
               <a:ext cx="4205186" cy="1682091"/>
             </a:xfrm>
             <a:prstGeom prst="flowChartDecision">
@@ -4054,7 +4054,7 @@
           </p:nvSpPr>
           <p:spPr>
             <a:xfrm>
-              <a:off x="6197834" y="13708988"/>
+              <a:off x="5349694" y="13589717"/>
               <a:ext cx="6151056" cy="1415625"/>
             </a:xfrm>
             <a:prstGeom prst="parallelogram">
@@ -4167,7 +4167,7 @@
           </p:nvSpPr>
           <p:spPr>
             <a:xfrm>
-              <a:off x="5517505" y="275739"/>
+              <a:off x="4669365" y="156468"/>
               <a:ext cx="1372666" cy="420872"/>
             </a:xfrm>
             <a:prstGeom prst="flowChartTerminator">
@@ -4232,7 +4232,7 @@
           </p:nvSpPr>
           <p:spPr>
             <a:xfrm>
-              <a:off x="5654555" y="15456098"/>
+              <a:off x="4806415" y="15336827"/>
               <a:ext cx="1098566" cy="454807"/>
             </a:xfrm>
             <a:prstGeom prst="flowChartTerminator">
@@ -4297,7 +4297,7 @@
           </p:nvSpPr>
           <p:spPr>
             <a:xfrm>
-              <a:off x="2208647" y="11281475"/>
+              <a:off x="1360507" y="11282470"/>
               <a:ext cx="3014742" cy="1382934"/>
             </a:xfrm>
             <a:prstGeom prst="flowChartDecision">
@@ -4362,7 +4362,7 @@
           </p:nvSpPr>
           <p:spPr>
             <a:xfrm>
-              <a:off x="2084276" y="13150099"/>
+              <a:off x="1236136" y="13151094"/>
               <a:ext cx="3263483" cy="1198926"/>
             </a:xfrm>
             <a:prstGeom prst="diamond">
@@ -4431,7 +4431,7 @@
           </p:nvCxnSpPr>
           <p:spPr>
             <a:xfrm rot="5400000">
-              <a:off x="7645321" y="14232413"/>
+              <a:off x="6797181" y="14113142"/>
               <a:ext cx="558889" cy="2343288"/>
             </a:xfrm>
             <a:prstGeom prst="bentConnector2">
@@ -4476,7 +4476,7 @@
           </p:nvCxnSpPr>
           <p:spPr>
             <a:xfrm>
-              <a:off x="9147497" y="13150099"/>
+              <a:off x="8299357" y="13030828"/>
               <a:ext cx="0" cy="566765"/>
             </a:xfrm>
             <a:prstGeom prst="straightConnector1">
@@ -4521,7 +4521,7 @@
           </p:nvCxnSpPr>
           <p:spPr>
             <a:xfrm>
-              <a:off x="9147497" y="10901243"/>
+              <a:off x="8299357" y="10781972"/>
               <a:ext cx="0" cy="566765"/>
             </a:xfrm>
             <a:prstGeom prst="straightConnector1">
@@ -4566,7 +4566,7 @@
           </p:nvCxnSpPr>
           <p:spPr>
             <a:xfrm flipH="1">
-              <a:off x="9147497" y="9037525"/>
+              <a:off x="8299357" y="8918254"/>
               <a:ext cx="1" cy="480785"/>
             </a:xfrm>
             <a:prstGeom prst="straightConnector1">
@@ -4611,7 +4611,7 @@
           </p:nvCxnSpPr>
           <p:spPr>
             <a:xfrm flipH="1">
-              <a:off x="3716018" y="10920741"/>
+              <a:off x="2867878" y="10921736"/>
               <a:ext cx="1" cy="360734"/>
             </a:xfrm>
             <a:prstGeom prst="straightConnector1">
@@ -4656,7 +4656,7 @@
           </p:nvCxnSpPr>
           <p:spPr>
             <a:xfrm>
-              <a:off x="3716018" y="12664409"/>
+              <a:off x="2867878" y="12665404"/>
               <a:ext cx="0" cy="485690"/>
             </a:xfrm>
             <a:prstGeom prst="straightConnector1">
@@ -4702,7 +4702,7 @@
           </p:nvCxnSpPr>
           <p:spPr>
             <a:xfrm>
-              <a:off x="3706834" y="8113512"/>
+              <a:off x="2858694" y="7994241"/>
               <a:ext cx="9185" cy="277724"/>
             </a:xfrm>
             <a:prstGeom prst="straightConnector1">
@@ -4748,8 +4748,8 @@
           </p:nvCxnSpPr>
           <p:spPr>
             <a:xfrm>
-              <a:off x="3716019" y="9408917"/>
-              <a:ext cx="0" cy="453245"/>
+              <a:off x="2867879" y="9399039"/>
+              <a:ext cx="0" cy="464118"/>
             </a:xfrm>
             <a:prstGeom prst="straightConnector1">
               <a:avLst/>
@@ -4793,12 +4793,12 @@
           </p:nvCxnSpPr>
           <p:spPr>
             <a:xfrm rot="10800000">
-              <a:off x="1813962" y="7017554"/>
-              <a:ext cx="270315" cy="6732008"/>
+              <a:off x="965822" y="6898283"/>
+              <a:ext cx="270315" cy="6852274"/>
             </a:xfrm>
             <a:prstGeom prst="bentConnector3">
               <a:avLst>
-                <a:gd name="adj1" fmla="val 282618"/>
+                <a:gd name="adj1" fmla="val 292423"/>
               </a:avLst>
             </a:prstGeom>
             <a:ln w="76200">
@@ -4841,12 +4841,12 @@
           </p:nvCxnSpPr>
           <p:spPr>
             <a:xfrm flipV="1">
-              <a:off x="5347759" y="6130628"/>
-              <a:ext cx="1572777" cy="7618934"/>
+              <a:off x="4499619" y="6011357"/>
+              <a:ext cx="1572777" cy="7739200"/>
             </a:xfrm>
             <a:prstGeom prst="bentConnector3">
               <a:avLst>
-                <a:gd name="adj1" fmla="val 58182"/>
+                <a:gd name="adj1" fmla="val 50000"/>
               </a:avLst>
             </a:prstGeom>
             <a:ln w="76200">
@@ -4889,12 +4889,12 @@
           </p:nvCxnSpPr>
           <p:spPr>
             <a:xfrm>
-              <a:off x="5223389" y="11972942"/>
-              <a:ext cx="1151398" cy="2443859"/>
+              <a:off x="4375249" y="11973937"/>
+              <a:ext cx="1151398" cy="2323593"/>
             </a:xfrm>
             <a:prstGeom prst="bentConnector3">
               <a:avLst>
-                <a:gd name="adj1" fmla="val 67840"/>
+                <a:gd name="adj1" fmla="val 60158"/>
               </a:avLst>
             </a:prstGeom>
             <a:ln w="76200">
@@ -4936,7 +4936,7 @@
           </p:nvCxnSpPr>
           <p:spPr>
             <a:xfrm>
-              <a:off x="9145540" y="7705015"/>
+              <a:off x="8297400" y="7585744"/>
               <a:ext cx="1958" cy="295888"/>
             </a:xfrm>
             <a:prstGeom prst="straightConnector1">
@@ -4981,7 +4981,7 @@
           </p:nvCxnSpPr>
           <p:spPr>
             <a:xfrm rot="10800000">
-              <a:off x="6920537" y="7170283"/>
+              <a:off x="6072397" y="7051012"/>
               <a:ext cx="251403" cy="3039495"/>
             </a:xfrm>
             <a:prstGeom prst="bentConnector3">
@@ -5028,8 +5028,8 @@
           </p:nvCxnSpPr>
           <p:spPr>
             <a:xfrm>
-              <a:off x="5077169" y="8900077"/>
-              <a:ext cx="908803" cy="3058829"/>
+              <a:off x="4229029" y="8835502"/>
+              <a:ext cx="844588" cy="3138435"/>
             </a:xfrm>
             <a:prstGeom prst="bentConnector2">
               <a:avLst/>
@@ -5073,7 +5073,7 @@
           </p:nvCxnSpPr>
           <p:spPr>
             <a:xfrm rot="5400000">
-              <a:off x="4570031" y="4287788"/>
+              <a:off x="3721891" y="4168517"/>
               <a:ext cx="770612" cy="2497005"/>
             </a:xfrm>
             <a:prstGeom prst="bentConnector3">
@@ -5117,7 +5117,7 @@
           </p:nvCxnSpPr>
           <p:spPr>
             <a:xfrm flipH="1" flipV="1">
-              <a:off x="6203838" y="5531165"/>
+              <a:off x="5355698" y="5411894"/>
               <a:ext cx="5046252" cy="6777889"/>
             </a:xfrm>
             <a:prstGeom prst="bentConnector4">
@@ -5164,7 +5164,7 @@
           </p:nvCxnSpPr>
           <p:spPr>
             <a:xfrm>
-              <a:off x="10114931" y="8519214"/>
+              <a:off x="9266791" y="8399943"/>
               <a:ext cx="1787108" cy="0"/>
             </a:xfrm>
             <a:prstGeom prst="straightConnector1">
@@ -5206,7 +5206,7 @@
           </p:nvSpPr>
           <p:spPr>
             <a:xfrm>
-              <a:off x="5051527" y="8961288"/>
+              <a:off x="4203387" y="8842017"/>
               <a:ext cx="621307" cy="461665"/>
             </a:xfrm>
             <a:prstGeom prst="rect">
@@ -5244,7 +5244,7 @@
           </p:nvSpPr>
           <p:spPr>
             <a:xfrm>
-              <a:off x="3786212" y="12563478"/>
+              <a:off x="2938072" y="12564473"/>
               <a:ext cx="621307" cy="461665"/>
             </a:xfrm>
             <a:prstGeom prst="rect">
@@ -5282,7 +5282,7 @@
           </p:nvSpPr>
           <p:spPr>
             <a:xfrm>
-              <a:off x="1638465" y="13773587"/>
+              <a:off x="790325" y="13774582"/>
               <a:ext cx="621307" cy="461665"/>
             </a:xfrm>
             <a:prstGeom prst="rect">
@@ -5320,7 +5320,7 @@
           </p:nvSpPr>
           <p:spPr>
             <a:xfrm>
-              <a:off x="10097755" y="8570315"/>
+              <a:off x="9249615" y="8451044"/>
               <a:ext cx="621307" cy="461665"/>
             </a:xfrm>
             <a:prstGeom prst="rect">
@@ -5358,7 +5358,7 @@
           </p:nvSpPr>
           <p:spPr>
             <a:xfrm>
-              <a:off x="11196699" y="12361604"/>
+              <a:off x="10348559" y="12242333"/>
               <a:ext cx="621307" cy="461665"/>
             </a:xfrm>
             <a:prstGeom prst="rect">
@@ -5396,7 +5396,7 @@
           </p:nvSpPr>
           <p:spPr>
             <a:xfrm>
-              <a:off x="9239455" y="10831658"/>
+              <a:off x="8391315" y="10712387"/>
               <a:ext cx="621307" cy="461665"/>
             </a:xfrm>
             <a:prstGeom prst="rect">
@@ -5434,7 +5434,7 @@
           </p:nvSpPr>
           <p:spPr>
             <a:xfrm>
-              <a:off x="6617247" y="10249901"/>
+              <a:off x="5769107" y="10130630"/>
               <a:ext cx="705900" cy="461665"/>
             </a:xfrm>
             <a:prstGeom prst="rect">
@@ -5472,7 +5472,7 @@
           </p:nvSpPr>
           <p:spPr>
             <a:xfrm>
-              <a:off x="8486871" y="13065496"/>
+              <a:off x="7638731" y="12946225"/>
               <a:ext cx="705900" cy="461665"/>
             </a:xfrm>
             <a:prstGeom prst="rect">
@@ -5510,7 +5510,7 @@
           </p:nvSpPr>
           <p:spPr>
             <a:xfrm>
-              <a:off x="8414623" y="8920109"/>
+              <a:off x="7566483" y="8800838"/>
               <a:ext cx="705900" cy="461665"/>
             </a:xfrm>
             <a:prstGeom prst="rect">
@@ -5548,7 +5548,7 @@
           </p:nvSpPr>
           <p:spPr>
             <a:xfrm>
-              <a:off x="3010118" y="9311508"/>
+              <a:off x="2192267" y="9293328"/>
               <a:ext cx="705900" cy="461665"/>
             </a:xfrm>
             <a:prstGeom prst="rect">
@@ -5586,7 +5586,7 @@
           </p:nvSpPr>
           <p:spPr>
             <a:xfrm>
-              <a:off x="5223389" y="13724993"/>
+              <a:off x="4277393" y="13747841"/>
               <a:ext cx="705900" cy="461665"/>
             </a:xfrm>
             <a:prstGeom prst="rect">

</xml_diff>